<commit_message>
Updated link to github url in the presentation
</commit_message>
<xml_diff>
--- a/beginner/Golang beginner workshop.pptx
+++ b/beginner/Golang beginner workshop.pptx
@@ -3193,11 +3193,7 @@
           <a:p>
             <a:r>
               <a:rPr lang="en-US" dirty="0" smtClean="0"/>
-              <a:t>Chetan </a:t>
-            </a:r>
-            <a:r>
-              <a:rPr lang="en-US" dirty="0" smtClean="0"/>
-              <a:t>Sachdev</a:t>
+              <a:t>Chetan Sachdev</a:t>
             </a:r>
           </a:p>
           <a:p>
@@ -10140,7 +10136,6 @@
               <a:rPr lang="en-US" dirty="0"/>
               <a:t>05.1-multipleassignment.go</a:t>
             </a:r>
-            <a:endParaRPr lang="en-US" dirty="0"/>
           </a:p>
         </p:txBody>
       </p:sp>
@@ -14364,7 +14359,6 @@
               <a:rPr lang="en-US" dirty="0"/>
               <a:t>07-goroutines.go</a:t>
             </a:r>
-            <a:endParaRPr lang="en-US" dirty="0"/>
           </a:p>
         </p:txBody>
       </p:sp>
@@ -14794,11 +14788,7 @@
             </a:pPr>
             <a:r>
               <a:rPr lang="en-US" dirty="0" err="1" smtClean="0"/>
-              <a:t>m</a:t>
-            </a:r>
-            <a:r>
-              <a:rPr lang="en-US" dirty="0" err="1" smtClean="0"/>
-              <a:t>yJob</a:t>
+              <a:t>myJob</a:t>
             </a:r>
             <a:r>
               <a:rPr lang="en-US" dirty="0" smtClean="0"/>
@@ -15191,11 +15181,7 @@
           <a:p>
             <a:r>
               <a:rPr lang="en-US" dirty="0" smtClean="0"/>
-              <a:t>Evolution </a:t>
-            </a:r>
-            <a:r>
-              <a:rPr lang="en-US" dirty="0" smtClean="0"/>
-              <a:t>of Go</a:t>
+              <a:t>Evolution of Go</a:t>
             </a:r>
             <a:endParaRPr lang="en-US" dirty="0"/>
           </a:p>
@@ -15362,11 +15348,7 @@
             </a:pPr>
             <a:r>
               <a:rPr lang="en-US" sz="1400" dirty="0" smtClean="0"/>
-              <a:t>and </a:t>
-            </a:r>
-            <a:r>
-              <a:rPr lang="en-US" sz="1400" dirty="0" smtClean="0"/>
-              <a:t>Read </a:t>
+              <a:t>and Read </a:t>
             </a:r>
             <a:r>
               <a:rPr lang="en-US" sz="1400" dirty="0"/>
@@ -15374,11 +15356,7 @@
             </a:r>
             <a:r>
               <a:rPr lang="en-US" sz="1400" dirty="0" smtClean="0"/>
-              <a:t>paper. CSP stands for </a:t>
-            </a:r>
-            <a:r>
-              <a:rPr lang="en-US" sz="1400" dirty="0" smtClean="0"/>
-              <a:t>Communicating </a:t>
+              <a:t>paper. CSP stands for Communicating </a:t>
             </a:r>
             <a:r>
               <a:rPr lang="en-US" sz="1400" dirty="0"/>
@@ -15403,7 +15381,6 @@
               <a:rPr lang="en-US" sz="1400" dirty="0" smtClean="0"/>
               <a:t> </a:t>
             </a:r>
-            <a:endParaRPr lang="en-US" sz="1400" dirty="0" smtClean="0"/>
           </a:p>
           <a:p>
             <a:pPr marL="0" indent="0">
@@ -15777,17 +15754,24 @@
               </a:rPr>
             </a:br>
             <a:r>
-              <a:rPr lang="en-US" dirty="0" err="1" smtClean="0">
-                <a:effectLst/>
-              </a:rPr>
-              <a:t>github</a:t>
+              <a:rPr lang="en-US" dirty="0">
+                <a:hlinkClick r:id="rId4"/>
+              </a:rPr>
+              <a:t>https://github.com/cksachdev/golang-presentations/tree/master/</a:t>
             </a:r>
             <a:r>
               <a:rPr lang="en-US" dirty="0" smtClean="0">
-                <a:effectLst/>
-              </a:rPr>
-              <a:t> link here..</a:t>
-            </a:r>
+                <a:hlinkClick r:id="rId4"/>
+              </a:rPr>
+              <a:t>beginner</a:t>
+            </a:r>
+            <a:r>
+              <a:rPr lang="en-US" dirty="0" smtClean="0"/>
+              <a:t> </a:t>
+            </a:r>
+            <a:endParaRPr lang="en-US" dirty="0" smtClean="0">
+              <a:effectLst/>
+            </a:endParaRPr>
           </a:p>
           <a:p>
             <a:r>
@@ -15984,11 +15968,7 @@
           <a:p>
             <a:r>
               <a:rPr lang="en-US" dirty="0" smtClean="0"/>
-              <a:t>01-helloworld</a:t>
-            </a:r>
-            <a:r>
-              <a:rPr lang="en-US" dirty="0" smtClean="0"/>
-              <a:t>.go</a:t>
+              <a:t>01-helloworld.go</a:t>
             </a:r>
             <a:endParaRPr lang="en-US" dirty="0"/>
           </a:p>

</xml_diff>

<commit_message>
Added link to tour.golang.org
</commit_message>
<xml_diff>
--- a/beginner/Golang beginner workshop.pptx
+++ b/beginner/Golang beginner workshop.pptx
@@ -17611,7 +17611,9 @@
         </p:nvSpPr>
         <p:spPr/>
         <p:txBody>
-          <a:bodyPr/>
+          <a:bodyPr>
+            <a:normAutofit fontScale="92500" lnSpcReduction="20000"/>
+          </a:bodyPr>
           <a:lstStyle/>
           <a:p>
             <a:r>
@@ -17650,7 +17652,55 @@
                 <a:effectLst/>
                 <a:hlinkClick r:id="rId3"/>
               </a:rPr>
-              <a:t>http://golang.org/doc/install</a:t>
+              <a:t>http://golang.org/doc/</a:t>
+            </a:r>
+            <a:r>
+              <a:rPr lang="en-US" dirty="0" smtClean="0">
+                <a:effectLst/>
+                <a:hlinkClick r:id="rId3"/>
+              </a:rPr>
+              <a:t>install</a:t>
+            </a:r>
+            <a:endParaRPr lang="en-US" dirty="0"/>
+          </a:p>
+          <a:p>
+            <a:pPr marL="0" indent="0" algn="ctr">
+              <a:buNone/>
+            </a:pPr>
+            <a:r>
+              <a:rPr lang="en-US" dirty="0" smtClean="0"/>
+              <a:t>Or</a:t>
+            </a:r>
+          </a:p>
+          <a:p>
+            <a:pPr marL="0" indent="0" algn="ctr">
+              <a:buNone/>
+            </a:pPr>
+            <a:r>
+              <a:rPr lang="en-US" dirty="0" smtClean="0">
+                <a:effectLst/>
+              </a:rPr>
+              <a:t>Follow </a:t>
+            </a:r>
+            <a:r>
+              <a:rPr lang="en-US" dirty="0"/>
+              <a:t>along with </a:t>
+            </a:r>
+            <a:r>
+              <a:rPr lang="en-US" dirty="0">
+                <a:hlinkClick r:id="rId4"/>
+              </a:rPr>
+              <a:t>http://tour.golang.org</a:t>
+            </a:r>
+            <a:r>
+              <a:rPr lang="en-US" dirty="0" smtClean="0">
+                <a:hlinkClick r:id="rId4"/>
+              </a:rPr>
+              <a:t>/</a:t>
+            </a:r>
+            <a:r>
+              <a:rPr lang="en-US" dirty="0" smtClean="0"/>
+              <a:t> </a:t>
             </a:r>
             <a:endParaRPr lang="en-US" dirty="0" smtClean="0">
               <a:effectLst/>
@@ -17670,13 +17720,13 @@
             </a:br>
             <a:r>
               <a:rPr lang="en-US" dirty="0">
-                <a:hlinkClick r:id="rId4"/>
+                <a:hlinkClick r:id="rId5"/>
               </a:rPr>
               <a:t>https://github.com/cksachdev/golang-presentations/tree/master/</a:t>
             </a:r>
             <a:r>
               <a:rPr lang="en-US" dirty="0" smtClean="0">
-                <a:hlinkClick r:id="rId4"/>
+                <a:hlinkClick r:id="rId5"/>
               </a:rPr>
               <a:t>beginner</a:t>
             </a:r>
@@ -17771,7 +17821,7 @@
         </p:nvSpPr>
         <p:spPr>
           <a:xfrm>
-            <a:off x="457200" y="1600201"/>
+            <a:off x="457200" y="1417638"/>
             <a:ext cx="8229600" cy="694724"/>
           </a:xfrm>
         </p:spPr>
@@ -17811,7 +17861,7 @@
         </p:blipFill>
         <p:spPr>
           <a:xfrm>
-            <a:off x="1086215" y="2434317"/>
+            <a:off x="1086215" y="1877830"/>
             <a:ext cx="6655871" cy="3691846"/>
           </a:xfrm>
           <a:prstGeom prst="rect">

</xml_diff>